<commit_message>
Clean up before moving location
</commit_message>
<xml_diff>
--- a/Model Slide RODeO.pptx
+++ b/Model Slide RODeO.pptx
@@ -7,13 +7,12 @@
     <p:sldMasterId id="2147483696" r:id="rId3"/>
   </p:sldMasterIdLst>
   <p:notesMasterIdLst>
-    <p:notesMasterId r:id="rId8"/>
+    <p:notesMasterId r:id="rId7"/>
   </p:notesMasterIdLst>
   <p:sldIdLst>
     <p:sldId id="275" r:id="rId4"/>
-    <p:sldId id="278" r:id="rId5"/>
-    <p:sldId id="277" r:id="rId6"/>
-    <p:sldId id="276" r:id="rId7"/>
+    <p:sldId id="277" r:id="rId5"/>
+    <p:sldId id="276" r:id="rId6"/>
   </p:sldIdLst>
   <p:sldSz cx="9144000" cy="6858000" type="screen4x3"/>
   <p:notesSz cx="7010400" cy="9296400"/>
@@ -219,7 +218,7 @@
           <a:p>
             <a:fld id="{DE45BC25-7985-425F-9FBB-3C38CB2116A1}" type="datetimeFigureOut">
               <a:rPr lang="en-US" smtClean="0"/>
-              <a:t>5/12/2020</a:t>
+              <a:t>8/4/2020</a:t>
             </a:fld>
             <a:endParaRPr lang="en-US"/>
           </a:p>
@@ -666,7 +665,7 @@
             <a:fld id="{1D8BD707-D9CF-40AE-B4C6-C98DA3205C09}" type="datetimeFigureOut">
               <a:rPr lang="en-US" smtClean="0"/>
               <a:pPr/>
-              <a:t>5/12/2020</a:t>
+              <a:t>8/4/2020</a:t>
             </a:fld>
             <a:endParaRPr lang="en-US"/>
           </a:p>
@@ -831,7 +830,7 @@
             <a:fld id="{1D8BD707-D9CF-40AE-B4C6-C98DA3205C09}" type="datetimeFigureOut">
               <a:rPr lang="en-US" smtClean="0"/>
               <a:pPr/>
-              <a:t>5/12/2020</a:t>
+              <a:t>8/4/2020</a:t>
             </a:fld>
             <a:endParaRPr lang="en-US"/>
           </a:p>
@@ -1006,7 +1005,7 @@
             <a:fld id="{1D8BD707-D9CF-40AE-B4C6-C98DA3205C09}" type="datetimeFigureOut">
               <a:rPr lang="en-US" smtClean="0"/>
               <a:pPr/>
-              <a:t>5/12/2020</a:t>
+              <a:t>8/4/2020</a:t>
             </a:fld>
             <a:endParaRPr lang="en-US"/>
           </a:p>
@@ -1254,7 +1253,7 @@
                 </a:solidFill>
               </a:rPr>
               <a:pPr/>
-              <a:t>5/12/2020</a:t>
+              <a:t>8/4/2020</a:t>
             </a:fld>
             <a:endParaRPr lang="en-US">
               <a:solidFill>
@@ -1468,7 +1467,7 @@
                 </a:solidFill>
               </a:rPr>
               <a:pPr/>
-              <a:t>5/12/2020</a:t>
+              <a:t>8/4/2020</a:t>
             </a:fld>
             <a:endParaRPr lang="en-US">
               <a:solidFill>
@@ -1748,7 +1747,7 @@
                 </a:solidFill>
               </a:rPr>
               <a:pPr/>
-              <a:t>5/12/2020</a:t>
+              <a:t>8/4/2020</a:t>
             </a:fld>
             <a:endParaRPr lang="en-US">
               <a:solidFill>
@@ -2068,7 +2067,7 @@
                 </a:solidFill>
               </a:rPr>
               <a:pPr/>
-              <a:t>5/12/2020</a:t>
+              <a:t>8/4/2020</a:t>
             </a:fld>
             <a:endParaRPr lang="en-US">
               <a:solidFill>
@@ -2522,7 +2521,7 @@
                 </a:solidFill>
               </a:rPr>
               <a:pPr/>
-              <a:t>5/12/2020</a:t>
+              <a:t>8/4/2020</a:t>
             </a:fld>
             <a:endParaRPr lang="en-US">
               <a:solidFill>
@@ -2674,7 +2673,7 @@
                 </a:solidFill>
               </a:rPr>
               <a:pPr/>
-              <a:t>5/12/2020</a:t>
+              <a:t>8/4/2020</a:t>
             </a:fld>
             <a:endParaRPr lang="en-US">
               <a:solidFill>
@@ -2804,7 +2803,7 @@
                 </a:solidFill>
               </a:rPr>
               <a:pPr/>
-              <a:t>5/12/2020</a:t>
+              <a:t>8/4/2020</a:t>
             </a:fld>
             <a:endParaRPr lang="en-US">
               <a:solidFill>
@@ -3114,7 +3113,7 @@
                 </a:solidFill>
               </a:rPr>
               <a:pPr/>
-              <a:t>5/12/2020</a:t>
+              <a:t>8/4/2020</a:t>
             </a:fld>
             <a:endParaRPr lang="en-US">
               <a:solidFill>
@@ -3311,7 +3310,7 @@
             <a:fld id="{1D8BD707-D9CF-40AE-B4C6-C98DA3205C09}" type="datetimeFigureOut">
               <a:rPr lang="en-US" smtClean="0"/>
               <a:pPr/>
-              <a:t>5/12/2020</a:t>
+              <a:t>8/4/2020</a:t>
             </a:fld>
             <a:endParaRPr lang="en-US"/>
           </a:p>
@@ -3569,7 +3568,7 @@
                 </a:solidFill>
               </a:rPr>
               <a:pPr/>
-              <a:t>5/12/2020</a:t>
+              <a:t>8/4/2020</a:t>
             </a:fld>
             <a:endParaRPr lang="en-US">
               <a:solidFill>
@@ -3772,7 +3771,7 @@
                 </a:solidFill>
               </a:rPr>
               <a:pPr/>
-              <a:t>5/12/2020</a:t>
+              <a:t>8/4/2020</a:t>
             </a:fld>
             <a:endParaRPr lang="en-US">
               <a:solidFill>
@@ -3985,7 +3984,7 @@
                 </a:solidFill>
               </a:rPr>
               <a:pPr/>
-              <a:t>5/12/2020</a:t>
+              <a:t>8/4/2020</a:t>
             </a:fld>
             <a:endParaRPr lang="en-US">
               <a:solidFill>
@@ -4265,7 +4264,7 @@
                 </a:solidFill>
               </a:rPr>
               <a:pPr/>
-              <a:t>5/12/2020</a:t>
+              <a:t>8/4/2020</a:t>
             </a:fld>
             <a:endParaRPr lang="en-US">
               <a:solidFill>
@@ -4479,7 +4478,7 @@
                 </a:solidFill>
               </a:rPr>
               <a:pPr/>
-              <a:t>5/12/2020</a:t>
+              <a:t>8/4/2020</a:t>
             </a:fld>
             <a:endParaRPr lang="en-US">
               <a:solidFill>
@@ -4759,7 +4758,7 @@
                 </a:solidFill>
               </a:rPr>
               <a:pPr/>
-              <a:t>5/12/2020</a:t>
+              <a:t>8/4/2020</a:t>
             </a:fld>
             <a:endParaRPr lang="en-US">
               <a:solidFill>
@@ -5079,7 +5078,7 @@
                 </a:solidFill>
               </a:rPr>
               <a:pPr/>
-              <a:t>5/12/2020</a:t>
+              <a:t>8/4/2020</a:t>
             </a:fld>
             <a:endParaRPr lang="en-US">
               <a:solidFill>
@@ -5533,7 +5532,7 @@
                 </a:solidFill>
               </a:rPr>
               <a:pPr/>
-              <a:t>5/12/2020</a:t>
+              <a:t>8/4/2020</a:t>
             </a:fld>
             <a:endParaRPr lang="en-US">
               <a:solidFill>
@@ -5685,7 +5684,7 @@
                 </a:solidFill>
               </a:rPr>
               <a:pPr/>
-              <a:t>5/12/2020</a:t>
+              <a:t>8/4/2020</a:t>
             </a:fld>
             <a:endParaRPr lang="en-US">
               <a:solidFill>
@@ -5815,7 +5814,7 @@
                 </a:solidFill>
               </a:rPr>
               <a:pPr/>
-              <a:t>5/12/2020</a:t>
+              <a:t>8/4/2020</a:t>
             </a:fld>
             <a:endParaRPr lang="en-US">
               <a:solidFill>
@@ -6089,7 +6088,7 @@
             <a:fld id="{1D8BD707-D9CF-40AE-B4C6-C98DA3205C09}" type="datetimeFigureOut">
               <a:rPr lang="en-US" smtClean="0"/>
               <a:pPr/>
-              <a:t>5/12/2020</a:t>
+              <a:t>8/4/2020</a:t>
             </a:fld>
             <a:endParaRPr lang="en-US"/>
           </a:p>
@@ -6367,7 +6366,7 @@
                 </a:solidFill>
               </a:rPr>
               <a:pPr/>
-              <a:t>5/12/2020</a:t>
+              <a:t>8/4/2020</a:t>
             </a:fld>
             <a:endParaRPr lang="en-US">
               <a:solidFill>
@@ -6657,7 +6656,7 @@
                 </a:solidFill>
               </a:rPr>
               <a:pPr/>
-              <a:t>5/12/2020</a:t>
+              <a:t>8/4/2020</a:t>
             </a:fld>
             <a:endParaRPr lang="en-US">
               <a:solidFill>
@@ -6860,7 +6859,7 @@
                 </a:solidFill>
               </a:rPr>
               <a:pPr/>
-              <a:t>5/12/2020</a:t>
+              <a:t>8/4/2020</a:t>
             </a:fld>
             <a:endParaRPr lang="en-US">
               <a:solidFill>
@@ -7073,7 +7072,7 @@
                 </a:solidFill>
               </a:rPr>
               <a:pPr/>
-              <a:t>5/12/2020</a:t>
+              <a:t>8/4/2020</a:t>
             </a:fld>
             <a:endParaRPr lang="en-US">
               <a:solidFill>
@@ -7387,7 +7386,7 @@
             <a:fld id="{1D8BD707-D9CF-40AE-B4C6-C98DA3205C09}" type="datetimeFigureOut">
               <a:rPr lang="en-US" smtClean="0"/>
               <a:pPr/>
-              <a:t>5/12/2020</a:t>
+              <a:t>8/4/2020</a:t>
             </a:fld>
             <a:endParaRPr lang="en-US"/>
           </a:p>
@@ -7803,7 +7802,7 @@
             <a:fld id="{1D8BD707-D9CF-40AE-B4C6-C98DA3205C09}" type="datetimeFigureOut">
               <a:rPr lang="en-US" smtClean="0"/>
               <a:pPr/>
-              <a:t>5/12/2020</a:t>
+              <a:t>8/4/2020</a:t>
             </a:fld>
             <a:endParaRPr lang="en-US"/>
           </a:p>
@@ -7917,7 +7916,7 @@
             <a:fld id="{1D8BD707-D9CF-40AE-B4C6-C98DA3205C09}" type="datetimeFigureOut">
               <a:rPr lang="en-US" smtClean="0"/>
               <a:pPr/>
-              <a:t>5/12/2020</a:t>
+              <a:t>8/4/2020</a:t>
             </a:fld>
             <a:endParaRPr lang="en-US"/>
           </a:p>
@@ -8009,7 +8008,7 @@
             <a:fld id="{1D8BD707-D9CF-40AE-B4C6-C98DA3205C09}" type="datetimeFigureOut">
               <a:rPr lang="en-US" smtClean="0"/>
               <a:pPr/>
-              <a:t>5/12/2020</a:t>
+              <a:t>8/4/2020</a:t>
             </a:fld>
             <a:endParaRPr lang="en-US"/>
           </a:p>
@@ -8281,7 +8280,7 @@
             <a:fld id="{1D8BD707-D9CF-40AE-B4C6-C98DA3205C09}" type="datetimeFigureOut">
               <a:rPr lang="en-US" smtClean="0"/>
               <a:pPr/>
-              <a:t>5/12/2020</a:t>
+              <a:t>8/4/2020</a:t>
             </a:fld>
             <a:endParaRPr lang="en-US"/>
           </a:p>
@@ -8530,7 +8529,7 @@
             <a:fld id="{1D8BD707-D9CF-40AE-B4C6-C98DA3205C09}" type="datetimeFigureOut">
               <a:rPr lang="en-US" smtClean="0"/>
               <a:pPr/>
-              <a:t>5/12/2020</a:t>
+              <a:t>8/4/2020</a:t>
             </a:fld>
             <a:endParaRPr lang="en-US"/>
           </a:p>
@@ -8738,7 +8737,7 @@
             <a:fld id="{1D8BD707-D9CF-40AE-B4C6-C98DA3205C09}" type="datetimeFigureOut">
               <a:rPr lang="en-US" smtClean="0"/>
               <a:pPr/>
-              <a:t>5/12/2020</a:t>
+              <a:t>8/4/2020</a:t>
             </a:fld>
             <a:endParaRPr lang="en-US"/>
           </a:p>
@@ -9237,7 +9236,7 @@
                 </a:solidFill>
               </a:rPr>
               <a:pPr defTabSz="913972"/>
-              <a:t>5/12/2020</a:t>
+              <a:t>8/4/2020</a:t>
             </a:fld>
             <a:endParaRPr lang="en-US">
               <a:solidFill>
@@ -9891,7 +9890,7 @@
                 </a:solidFill>
               </a:rPr>
               <a:pPr defTabSz="914079"/>
-              <a:t>5/12/2020</a:t>
+              <a:t>8/4/2020</a:t>
             </a:fld>
             <a:endParaRPr lang="en-US">
               <a:solidFill>
@@ -10872,7 +10871,7 @@
             </a:r>
             <a:r>
               <a:rPr lang="en-US" sz="1400" dirty="0"/>
-              <a:t>, Fleet-wide EV bus optimization optimization</a:t>
+              <a:t>, Fleet-wide EV bus optimization, hybrid power plant comparison (PV, wind and hydropower plus storage)</a:t>
             </a:r>
           </a:p>
           <a:p>
@@ -10892,7 +10891,7 @@
             </a:pPr>
             <a:r>
               <a:rPr lang="en-US" sz="1400" dirty="0"/>
-              <a:t>How should a device(s) operate to maximize revenue. With a focus on storage and flexible loads (i.e., electric vehicles, electrolyzer)?</a:t>
+              <a:t>How should a device(s) operate to maximize revenue?</a:t>
             </a:r>
           </a:p>
           <a:p>
@@ -10922,7 +10921,7 @@
             </a:pPr>
             <a:r>
               <a:rPr lang="en-US" sz="1400" dirty="0"/>
-              <a:t>Client and stakeholder involvement: DOE, CARB, PG&amp;E, GO-Biz, EPRI</a:t>
+              <a:t>Client and stakeholder involvement: DOE, CARB, PG&amp;E, GO-Biz, EPRI, SoCalGas</a:t>
             </a:r>
           </a:p>
         </p:txBody>
@@ -11220,576 +11219,6 @@
           <a:chExt cx="0" cy="0"/>
         </a:xfrm>
       </p:grpSpPr>
-      <p:cxnSp>
-        <p:nvCxnSpPr>
-          <p:cNvPr id="5" name="Straight Connector 4"/>
-          <p:cNvCxnSpPr>
-            <a:cxnSpLocks/>
-          </p:cNvCxnSpPr>
-          <p:nvPr/>
-        </p:nvCxnSpPr>
-        <p:spPr>
-          <a:xfrm>
-            <a:off x="483300" y="3515032"/>
-            <a:ext cx="4040370" cy="0"/>
-          </a:xfrm>
-          <a:prstGeom prst="line">
-            <a:avLst/>
-          </a:prstGeom>
-        </p:spPr>
-        <p:style>
-          <a:lnRef idx="1">
-            <a:schemeClr val="accent1"/>
-          </a:lnRef>
-          <a:fillRef idx="0">
-            <a:schemeClr val="accent1"/>
-          </a:fillRef>
-          <a:effectRef idx="0">
-            <a:schemeClr val="accent1"/>
-          </a:effectRef>
-          <a:fontRef idx="minor">
-            <a:schemeClr val="tx1"/>
-          </a:fontRef>
-        </p:style>
-      </p:cxnSp>
-      <p:cxnSp>
-        <p:nvCxnSpPr>
-          <p:cNvPr id="6" name="Straight Connector 5"/>
-          <p:cNvCxnSpPr/>
-          <p:nvPr/>
-        </p:nvCxnSpPr>
-        <p:spPr>
-          <a:xfrm flipV="1">
-            <a:off x="4523670" y="684866"/>
-            <a:ext cx="0" cy="5585220"/>
-          </a:xfrm>
-          <a:prstGeom prst="line">
-            <a:avLst/>
-          </a:prstGeom>
-        </p:spPr>
-        <p:style>
-          <a:lnRef idx="1">
-            <a:schemeClr val="accent1"/>
-          </a:lnRef>
-          <a:fillRef idx="0">
-            <a:schemeClr val="accent1"/>
-          </a:fillRef>
-          <a:effectRef idx="0">
-            <a:schemeClr val="accent1"/>
-          </a:effectRef>
-          <a:fontRef idx="minor">
-            <a:schemeClr val="tx1"/>
-          </a:fontRef>
-        </p:style>
-      </p:cxnSp>
-      <p:sp>
-        <p:nvSpPr>
-          <p:cNvPr id="9" name="TextBox 8"/>
-          <p:cNvSpPr txBox="1"/>
-          <p:nvPr/>
-        </p:nvSpPr>
-        <p:spPr>
-          <a:xfrm>
-            <a:off x="762001" y="121963"/>
-            <a:ext cx="7564207" cy="359850"/>
-          </a:xfrm>
-          <a:prstGeom prst="rect">
-            <a:avLst/>
-          </a:prstGeom>
-          <a:noFill/>
-        </p:spPr>
-        <p:txBody>
-          <a:bodyPr wrap="square" lIns="82048" tIns="41025" rIns="82048" bIns="41025" rtlCol="0">
-            <a:spAutoFit/>
-          </a:bodyPr>
-          <a:lstStyle/>
-          <a:p>
-            <a:pPr algn="ctr"/>
-            <a:r>
-              <a:rPr lang="en-US" b="1" dirty="0"/>
-              <a:t>Revenue, Operation, and Device Optimization Model (</a:t>
-            </a:r>
-            <a:r>
-              <a:rPr lang="en-US" b="1" dirty="0" err="1"/>
-              <a:t>RODeO</a:t>
-            </a:r>
-            <a:r>
-              <a:rPr lang="en-US" b="1" dirty="0"/>
-              <a:t>)</a:t>
-            </a:r>
-          </a:p>
-        </p:txBody>
-      </p:sp>
-      <p:sp>
-        <p:nvSpPr>
-          <p:cNvPr id="12" name="TextBox 11"/>
-          <p:cNvSpPr txBox="1"/>
-          <p:nvPr/>
-        </p:nvSpPr>
-        <p:spPr>
-          <a:xfrm>
-            <a:off x="4653668" y="447301"/>
-            <a:ext cx="4293358" cy="5899828"/>
-          </a:xfrm>
-          <a:prstGeom prst="rect">
-            <a:avLst/>
-          </a:prstGeom>
-          <a:noFill/>
-        </p:spPr>
-        <p:txBody>
-          <a:bodyPr wrap="square" lIns="82048" tIns="41025" rIns="82048" bIns="41025" rtlCol="0">
-            <a:spAutoFit/>
-          </a:bodyPr>
-          <a:lstStyle/>
-          <a:p>
-            <a:r>
-              <a:rPr lang="en-US" sz="1400" b="1" dirty="0"/>
-              <a:t>Model Details</a:t>
-            </a:r>
-          </a:p>
-          <a:p>
-            <a:pPr marL="307682" indent="-307682">
-              <a:buFont typeface="Arial" panose="020B0604020202020204" pitchFamily="34" charset="0"/>
-              <a:buChar char="•"/>
-            </a:pPr>
-            <a:r>
-              <a:rPr lang="en-US" sz="1400" dirty="0"/>
-              <a:t>Name: </a:t>
-            </a:r>
-            <a:r>
-              <a:rPr lang="en-US" sz="1400" dirty="0" err="1"/>
-              <a:t>RODeO</a:t>
-            </a:r>
-            <a:r>
-              <a:rPr lang="en-US" sz="1400" dirty="0"/>
-              <a:t> (Revenue, Operation, and Device Optimization) </a:t>
-            </a:r>
-          </a:p>
-          <a:p>
-            <a:pPr marL="307682" indent="-307682">
-              <a:buFont typeface="Arial" panose="020B0604020202020204" pitchFamily="34" charset="0"/>
-              <a:buChar char="•"/>
-            </a:pPr>
-            <a:r>
-              <a:rPr lang="en-US" sz="1400" dirty="0"/>
-              <a:t>Purpose: Fixed-price optimization</a:t>
-            </a:r>
-          </a:p>
-          <a:p>
-            <a:pPr marL="307682" indent="-307682">
-              <a:buFont typeface="Arial" panose="020B0604020202020204" pitchFamily="34" charset="0"/>
-              <a:buChar char="•"/>
-            </a:pPr>
-            <a:r>
-              <a:rPr lang="en-US" sz="1400" dirty="0"/>
-              <a:t>Temporal Resolution: typically 5min to 1 </a:t>
-            </a:r>
-            <a:r>
-              <a:rPr lang="en-US" sz="1400" dirty="0" err="1"/>
-              <a:t>hr</a:t>
-            </a:r>
-            <a:r>
-              <a:rPr lang="en-US" sz="1400" dirty="0"/>
-              <a:t> but can be adjusted</a:t>
-            </a:r>
-          </a:p>
-          <a:p>
-            <a:pPr marL="307682" indent="-307682">
-              <a:buFont typeface="Arial" panose="020B0604020202020204" pitchFamily="34" charset="0"/>
-              <a:buChar char="•"/>
-            </a:pPr>
-            <a:r>
-              <a:rPr lang="en-US" sz="1400" dirty="0"/>
-              <a:t>Temporal Scope: From 1 month to 3 years</a:t>
-            </a:r>
-          </a:p>
-          <a:p>
-            <a:pPr marL="307682" indent="-307682">
-              <a:buFont typeface="Arial" panose="020B0604020202020204" pitchFamily="34" charset="0"/>
-              <a:buChar char="•"/>
-            </a:pPr>
-            <a:r>
-              <a:rPr lang="en-US" sz="1400" dirty="0"/>
-              <a:t>Spatial Resolution: single location (node/region/etc.)</a:t>
-            </a:r>
-          </a:p>
-          <a:p>
-            <a:pPr marL="307682" indent="-307682">
-              <a:buFont typeface="Arial" panose="020B0604020202020204" pitchFamily="34" charset="0"/>
-              <a:buChar char="•"/>
-            </a:pPr>
-            <a:r>
-              <a:rPr lang="en-US" sz="1400" dirty="0"/>
-              <a:t>Spatial Scope: single location (node/region/etc.) can include many devices but all are aggregated under one node for wholesale or retail price calculations</a:t>
-            </a:r>
-          </a:p>
-          <a:p>
-            <a:pPr marL="307682" indent="-307682">
-              <a:buFont typeface="Arial" panose="020B0604020202020204" pitchFamily="34" charset="0"/>
-              <a:buChar char="•"/>
-            </a:pPr>
-            <a:r>
-              <a:rPr lang="en-US" sz="1400" dirty="0"/>
-              <a:t>System scope: Simulates participation in wholesale and retail, electric and gas markets</a:t>
-            </a:r>
-          </a:p>
-          <a:p>
-            <a:pPr marL="307682" indent="-307682">
-              <a:buFont typeface="Arial" panose="020B0604020202020204" pitchFamily="34" charset="0"/>
-              <a:buChar char="•"/>
-            </a:pPr>
-            <a:r>
-              <a:rPr lang="en-US" sz="1400" dirty="0"/>
-              <a:t>Modeling paradigm: Optimization</a:t>
-            </a:r>
-          </a:p>
-          <a:p>
-            <a:pPr marL="307682" indent="-307682">
-              <a:buFont typeface="Arial" panose="020B0604020202020204" pitchFamily="34" charset="0"/>
-              <a:buChar char="•"/>
-            </a:pPr>
-            <a:r>
-              <a:rPr lang="en-US" sz="1400" dirty="0"/>
-              <a:t>Major processes modeled: Revenue maximization</a:t>
-            </a:r>
-          </a:p>
-          <a:p>
-            <a:pPr marL="307682" indent="-307682">
-              <a:buFont typeface="Arial" panose="020B0604020202020204" pitchFamily="34" charset="0"/>
-              <a:buChar char="•"/>
-            </a:pPr>
-            <a:r>
-              <a:rPr lang="en-US" sz="1400" dirty="0"/>
-              <a:t>Uncertainty treatment: Scenarios</a:t>
-            </a:r>
-          </a:p>
-          <a:p>
-            <a:pPr marL="307682" indent="-307682">
-              <a:buFont typeface="Arial" panose="020B0604020202020204" pitchFamily="34" charset="0"/>
-              <a:buChar char="•"/>
-            </a:pPr>
-            <a:r>
-              <a:rPr lang="en-US" sz="1400" dirty="0"/>
-              <a:t>Computational scalability: Model typically runs fast (30sec – 5 min) and it can be run in parallel</a:t>
-            </a:r>
-          </a:p>
-          <a:p>
-            <a:pPr marL="307682" indent="-307682">
-              <a:buFont typeface="Arial" panose="020B0604020202020204" pitchFamily="34" charset="0"/>
-              <a:buChar char="•"/>
-            </a:pPr>
-            <a:r>
-              <a:rPr lang="en-US" sz="1400" dirty="0"/>
-              <a:t>Use of HPC: Possible</a:t>
-            </a:r>
-          </a:p>
-          <a:p>
-            <a:pPr marL="307682" indent="-307682">
-              <a:buFont typeface="Arial" panose="020B0604020202020204" pitchFamily="34" charset="0"/>
-              <a:buChar char="•"/>
-            </a:pPr>
-            <a:r>
-              <a:rPr lang="en-US" sz="1400" dirty="0"/>
-              <a:t>Primary development organization: NREL</a:t>
-            </a:r>
-          </a:p>
-          <a:p>
-            <a:pPr marL="307682" indent="-307682">
-              <a:buFont typeface="Arial" panose="020B0604020202020204" pitchFamily="34" charset="0"/>
-              <a:buChar char="•"/>
-            </a:pPr>
-            <a:r>
-              <a:rPr lang="en-US" sz="1400" dirty="0"/>
-              <a:t>Source Language: GAMS</a:t>
-            </a:r>
-          </a:p>
-          <a:p>
-            <a:pPr marL="307682" indent="-307682">
-              <a:buFont typeface="Arial" panose="020B0604020202020204" pitchFamily="34" charset="0"/>
-              <a:buChar char="•"/>
-            </a:pPr>
-            <a:r>
-              <a:rPr lang="en-US" sz="1400" dirty="0"/>
-              <a:t>Platform: Cross-platform</a:t>
-            </a:r>
-          </a:p>
-          <a:p>
-            <a:pPr marL="307682" indent="-307682">
-              <a:buFont typeface="Arial" panose="020B0604020202020204" pitchFamily="34" charset="0"/>
-              <a:buChar char="•"/>
-            </a:pPr>
-            <a:r>
-              <a:rPr lang="en-US" sz="1400" dirty="0"/>
-              <a:t>License:  Exploring open-sourcing</a:t>
-            </a:r>
-          </a:p>
-          <a:p>
-            <a:pPr marL="307682" indent="-307682">
-              <a:buFont typeface="Arial" panose="020B0604020202020204" pitchFamily="34" charset="0"/>
-              <a:buChar char="•"/>
-            </a:pPr>
-            <a:r>
-              <a:rPr lang="en-US" sz="1400" dirty="0"/>
-              <a:t>Source: Lab-developed</a:t>
-            </a:r>
-          </a:p>
-          <a:p>
-            <a:pPr marL="307682" indent="-307682">
-              <a:buFont typeface="Arial" panose="020B0604020202020204" pitchFamily="34" charset="0"/>
-              <a:buChar char="•"/>
-            </a:pPr>
-            <a:r>
-              <a:rPr lang="en-US" sz="1400" dirty="0"/>
-              <a:t>Dataset restrictions: None</a:t>
-            </a:r>
-          </a:p>
-          <a:p>
-            <a:pPr marL="307682" indent="-307682">
-              <a:buFont typeface="Arial" panose="020B0604020202020204" pitchFamily="34" charset="0"/>
-              <a:buChar char="•"/>
-            </a:pPr>
-            <a:r>
-              <a:rPr lang="en-US" sz="1400" dirty="0"/>
-              <a:t>NREL PI: </a:t>
-            </a:r>
-            <a:r>
-              <a:rPr lang="en-US" sz="1400" dirty="0">
-                <a:hlinkClick r:id="rId2"/>
-              </a:rPr>
-              <a:t>Joshua.Eichman@NREL.gov</a:t>
-            </a:r>
-            <a:r>
-              <a:rPr lang="en-US" sz="1400" dirty="0"/>
-              <a:t> </a:t>
-            </a:r>
-          </a:p>
-          <a:p>
-            <a:pPr marL="307682" indent="-307682">
-              <a:buFont typeface="Arial" panose="020B0604020202020204" pitchFamily="34" charset="0"/>
-              <a:buChar char="•"/>
-            </a:pPr>
-            <a:r>
-              <a:rPr lang="en-US" sz="1400" dirty="0"/>
-              <a:t>Link: </a:t>
-            </a:r>
-            <a:r>
-              <a:rPr lang="en-US" sz="1400" dirty="0">
-                <a:hlinkClick r:id="rId3"/>
-              </a:rPr>
-              <a:t>https://github.nrel.gov/jeichman/RODeO</a:t>
-            </a:r>
-            <a:r>
-              <a:rPr lang="en-US" sz="1400" dirty="0"/>
-              <a:t> </a:t>
-            </a:r>
-          </a:p>
-        </p:txBody>
-      </p:sp>
-      <p:sp>
-        <p:nvSpPr>
-          <p:cNvPr id="13" name="TextBox 12"/>
-          <p:cNvSpPr txBox="1"/>
-          <p:nvPr/>
-        </p:nvSpPr>
-        <p:spPr>
-          <a:xfrm>
-            <a:off x="167154" y="3542072"/>
-            <a:ext cx="4356516" cy="3314505"/>
-          </a:xfrm>
-          <a:prstGeom prst="rect">
-            <a:avLst/>
-          </a:prstGeom>
-          <a:noFill/>
-        </p:spPr>
-        <p:txBody>
-          <a:bodyPr wrap="square" lIns="82048" tIns="41025" rIns="82048" bIns="41025" rtlCol="0">
-            <a:spAutoFit/>
-          </a:bodyPr>
-          <a:lstStyle/>
-          <a:p>
-            <a:r>
-              <a:rPr lang="en-US" sz="1400" b="1" dirty="0"/>
-              <a:t>Prior Applications</a:t>
-            </a:r>
-          </a:p>
-          <a:p>
-            <a:pPr marL="307682" indent="-307682">
-              <a:buFont typeface="Arial" panose="020B0604020202020204" pitchFamily="34" charset="0"/>
-              <a:buChar char="•"/>
-            </a:pPr>
-            <a:r>
-              <a:rPr lang="en-US" sz="1400" dirty="0">
-                <a:hlinkClick r:id="rId4"/>
-              </a:rPr>
-              <a:t>Multi-market optimization</a:t>
-            </a:r>
-            <a:r>
-              <a:rPr lang="en-US" sz="1400" dirty="0"/>
-              <a:t>, </a:t>
-            </a:r>
-            <a:r>
-              <a:rPr lang="en-US" sz="1400" dirty="0">
-                <a:hlinkClick r:id="rId5"/>
-              </a:rPr>
-              <a:t>Wholesale market revenue comparison</a:t>
-            </a:r>
-            <a:r>
-              <a:rPr lang="en-US" sz="1400" dirty="0"/>
-              <a:t>, </a:t>
-            </a:r>
-            <a:r>
-              <a:rPr lang="en-US" sz="1400" dirty="0">
-                <a:hlinkClick r:id="rId6"/>
-              </a:rPr>
-              <a:t>Hydrogen business case assessment</a:t>
-            </a:r>
-            <a:r>
-              <a:rPr lang="en-US" sz="1400" dirty="0"/>
-              <a:t>, </a:t>
-            </a:r>
-            <a:r>
-              <a:rPr lang="en-US" sz="1400" dirty="0">
-                <a:hlinkClick r:id="rId7"/>
-              </a:rPr>
-              <a:t>Retail rate optimization</a:t>
-            </a:r>
-            <a:r>
-              <a:rPr lang="en-US" sz="1400" dirty="0"/>
-              <a:t>, Off-shore wind farm revenue, </a:t>
-            </a:r>
-            <a:r>
-              <a:rPr lang="en-US" sz="1400" dirty="0">
-                <a:hlinkClick r:id="rId8"/>
-              </a:rPr>
-              <a:t>PV+Storage</a:t>
-            </a:r>
-            <a:r>
-              <a:rPr lang="en-US" sz="1400" dirty="0"/>
-              <a:t>, </a:t>
-            </a:r>
-            <a:r>
-              <a:rPr lang="en-US" sz="1400" dirty="0">
-                <a:hlinkClick r:id="rId9"/>
-              </a:rPr>
-              <a:t>Real-time optimization control of electrolyzer</a:t>
-            </a:r>
-            <a:r>
-              <a:rPr lang="en-US" sz="1400" dirty="0"/>
-              <a:t>, Fleet-wide EV bus optimization optimization</a:t>
-            </a:r>
-          </a:p>
-          <a:p>
-            <a:pPr marL="307682" indent="-307682">
-              <a:buFont typeface="Arial" panose="020B0604020202020204" pitchFamily="34" charset="0"/>
-              <a:buChar char="•"/>
-            </a:pPr>
-            <a:r>
-              <a:rPr lang="en-US" sz="1400" dirty="0"/>
-              <a:t>Research questions: </a:t>
-            </a:r>
-          </a:p>
-          <a:p>
-            <a:pPr marL="764828" lvl="1" indent="-307682">
-              <a:buFont typeface="Arial" panose="020B0604020202020204" pitchFamily="34" charset="0"/>
-              <a:buChar char="•"/>
-            </a:pPr>
-            <a:r>
-              <a:rPr lang="en-US" sz="1400" dirty="0"/>
-              <a:t>How should a device(s) operate to maximize revenue. With a focus on storage and flexible loads (i.e., electric vehicles, electrolyzer)?</a:t>
-            </a:r>
-          </a:p>
-          <a:p>
-            <a:pPr marL="764828" lvl="1" indent="-307682">
-              <a:buFont typeface="Arial" panose="020B0604020202020204" pitchFamily="34" charset="0"/>
-              <a:buChar char="•"/>
-            </a:pPr>
-            <a:r>
-              <a:rPr lang="en-US" sz="1400" dirty="0"/>
-              <a:t>Is a device economically competitive?</a:t>
-            </a:r>
-          </a:p>
-          <a:p>
-            <a:pPr marL="764828" lvl="1" indent="-307682">
-              <a:buFont typeface="Arial" panose="020B0604020202020204" pitchFamily="34" charset="0"/>
-              <a:buChar char="•"/>
-            </a:pPr>
-            <a:r>
-              <a:rPr lang="en-US" sz="1400" dirty="0"/>
-              <a:t>How to optimally stack multiple value streams?</a:t>
-            </a:r>
-          </a:p>
-          <a:p>
-            <a:pPr marL="307682" indent="-307682">
-              <a:buFont typeface="Arial" panose="020B0604020202020204" pitchFamily="34" charset="0"/>
-              <a:buChar char="•"/>
-            </a:pPr>
-            <a:r>
-              <a:rPr lang="en-US" sz="1400" dirty="0"/>
-              <a:t>Client and stakeholder involvement: DOE, CARB, PG&amp;E, GO-Biz, EPRI</a:t>
-            </a:r>
-          </a:p>
-        </p:txBody>
-      </p:sp>
-      <p:pic>
-        <p:nvPicPr>
-          <p:cNvPr id="18" name="Picture 17">
-            <a:extLst>
-              <a:ext uri="{FF2B5EF4-FFF2-40B4-BE49-F238E27FC236}">
-                <a16:creationId xmlns:a16="http://schemas.microsoft.com/office/drawing/2014/main" id="{1F763800-8F6C-4856-9ACD-60FFD379A82F}"/>
-              </a:ext>
-            </a:extLst>
-          </p:cNvPr>
-          <p:cNvPicPr>
-            <a:picLocks noChangeAspect="1"/>
-          </p:cNvPicPr>
-          <p:nvPr/>
-        </p:nvPicPr>
-        <p:blipFill>
-          <a:blip r:embed="rId10"/>
-          <a:stretch>
-            <a:fillRect/>
-          </a:stretch>
-        </p:blipFill>
-        <p:spPr>
-          <a:xfrm>
-            <a:off x="509732" y="515089"/>
-            <a:ext cx="3860447" cy="3026555"/>
-          </a:xfrm>
-          <a:prstGeom prst="rect">
-            <a:avLst/>
-          </a:prstGeom>
-        </p:spPr>
-      </p:pic>
-    </p:spTree>
-    <p:extLst>
-      <p:ext uri="{BB962C8B-B14F-4D97-AF65-F5344CB8AC3E}">
-        <p14:creationId xmlns:p14="http://schemas.microsoft.com/office/powerpoint/2010/main" val="579332585"/>
-      </p:ext>
-    </p:extLst>
-  </p:cSld>
-  <p:clrMapOvr>
-    <a:masterClrMapping/>
-  </p:clrMapOvr>
-</p:sld>
-</file>
-
-<file path=ppt/slides/slide3.xml><?xml version="1.0" encoding="utf-8"?>
-<p:sld xmlns:a="http://schemas.openxmlformats.org/drawingml/2006/main" xmlns:r="http://schemas.openxmlformats.org/officeDocument/2006/relationships" xmlns:p="http://schemas.openxmlformats.org/presentationml/2006/main">
-  <p:cSld>
-    <p:spTree>
-      <p:nvGrpSpPr>
-        <p:cNvPr id="1" name=""/>
-        <p:cNvGrpSpPr/>
-        <p:nvPr/>
-      </p:nvGrpSpPr>
-      <p:grpSpPr>
-        <a:xfrm>
-          <a:off x="0" y="0"/>
-          <a:ext cx="0" cy="0"/>
-          <a:chOff x="0" y="0"/>
-          <a:chExt cx="0" cy="0"/>
-        </a:xfrm>
-      </p:grpSpPr>
       <p:pic>
         <p:nvPicPr>
           <p:cNvPr id="31" name="Picture 30">
@@ -11833,7 +11262,7 @@
 </p:sld>
 </file>
 
-<file path=ppt/slides/slide4.xml><?xml version="1.0" encoding="utf-8"?>
+<file path=ppt/slides/slide3.xml><?xml version="1.0" encoding="utf-8"?>
 <p:sld xmlns:a="http://schemas.openxmlformats.org/drawingml/2006/main" xmlns:r="http://schemas.openxmlformats.org/officeDocument/2006/relationships" xmlns:p="http://schemas.openxmlformats.org/presentationml/2006/main">
   <p:cSld>
     <p:spTree>

</xml_diff>